<commit_message>
add what else slide
</commit_message>
<xml_diff>
--- a/slides/04 - Reading Files.pptx
+++ b/slides/04 - Reading Files.pptx
@@ -5,7 +5,7 @@
     <p:sldMasterId id="2147483660" r:id="rId1"/>
   </p:sldMasterIdLst>
   <p:notesMasterIdLst>
-    <p:notesMasterId r:id="rId31"/>
+    <p:notesMasterId r:id="rId32"/>
   </p:notesMasterIdLst>
   <p:sldIdLst>
     <p:sldId id="256" r:id="rId2"/>
@@ -37,6 +37,7 @@
     <p:sldId id="287" r:id="rId28"/>
     <p:sldId id="288" r:id="rId29"/>
     <p:sldId id="302" r:id="rId30"/>
+    <p:sldId id="306" r:id="rId31"/>
   </p:sldIdLst>
   <p:sldSz cx="12192000" cy="6858000"/>
   <p:notesSz cx="6858000" cy="9144000"/>
@@ -164,6 +165,22 @@
 
 <file path=ppt/changesInfos/changesInfo1.xml><?xml version="1.0" encoding="utf-8"?>
 <pc:chgInfo xmlns:a="http://schemas.openxmlformats.org/drawingml/2006/main" xmlns:r="http://schemas.openxmlformats.org/officeDocument/2006/relationships" xmlns:ac="http://schemas.microsoft.com/office/drawing/2013/main/command" xmlns:pc="http://schemas.microsoft.com/office/powerpoint/2013/main/command">
+  <pc:docChgLst>
+    <pc:chgData name="Patrick C Mathias" userId="1f09a1f0-1fe3-4224-a48c-12494ec224fd" providerId="ADAL" clId="{37C09DC7-01A6-E34C-AFB3-63E13D899692}"/>
+    <pc:docChg chg="modSld">
+      <pc:chgData name="Patrick C Mathias" userId="1f09a1f0-1fe3-4224-a48c-12494ec224fd" providerId="ADAL" clId="{37C09DC7-01A6-E34C-AFB3-63E13D899692}" dt="2023-03-28T16:58:08.208" v="0" actId="20577"/>
+      <pc:docMkLst>
+        <pc:docMk/>
+      </pc:docMkLst>
+      <pc:sldChg chg="modNotesTx">
+        <pc:chgData name="Patrick C Mathias" userId="1f09a1f0-1fe3-4224-a48c-12494ec224fd" providerId="ADAL" clId="{37C09DC7-01A6-E34C-AFB3-63E13D899692}" dt="2023-03-28T16:58:08.208" v="0" actId="20577"/>
+        <pc:sldMkLst>
+          <pc:docMk/>
+          <pc:sldMk cId="1841415109" sldId="292"/>
+        </pc:sldMkLst>
+      </pc:sldChg>
+    </pc:docChg>
+  </pc:docChgLst>
   <pc:docChgLst>
     <pc:chgData name="Patrick C Mathias" userId="1f09a1f0-1fe3-4224-a48c-12494ec224fd" providerId="ADAL" clId="{5C85580C-6DA4-FF41-BA4A-7817A35F115F}"/>
     <pc:docChg chg="custSel addSld delSld modSld">
@@ -425,22 +442,6 @@
       </pc:sldChg>
     </pc:docChg>
   </pc:docChgLst>
-  <pc:docChgLst>
-    <pc:chgData name="Patrick C Mathias" userId="1f09a1f0-1fe3-4224-a48c-12494ec224fd" providerId="ADAL" clId="{37C09DC7-01A6-E34C-AFB3-63E13D899692}"/>
-    <pc:docChg chg="modSld">
-      <pc:chgData name="Patrick C Mathias" userId="1f09a1f0-1fe3-4224-a48c-12494ec224fd" providerId="ADAL" clId="{37C09DC7-01A6-E34C-AFB3-63E13D899692}" dt="2023-03-28T16:58:08.208" v="0" actId="20577"/>
-      <pc:docMkLst>
-        <pc:docMk/>
-      </pc:docMkLst>
-      <pc:sldChg chg="modNotesTx">
-        <pc:chgData name="Patrick C Mathias" userId="1f09a1f0-1fe3-4224-a48c-12494ec224fd" providerId="ADAL" clId="{37C09DC7-01A6-E34C-AFB3-63E13D899692}" dt="2023-03-28T16:58:08.208" v="0" actId="20577"/>
-        <pc:sldMkLst>
-          <pc:docMk/>
-          <pc:sldMk cId="1841415109" sldId="292"/>
-        </pc:sldMkLst>
-      </pc:sldChg>
-    </pc:docChg>
-  </pc:docChgLst>
 </pc:chgInfo>
 </file>
 
@@ -1039,6 +1040,90 @@
     <p:extLst>
       <p:ext uri="{BB962C8B-B14F-4D97-AF65-F5344CB8AC3E}">
         <p14:creationId xmlns:p14="http://schemas.microsoft.com/office/powerpoint/2010/main" val="2606641292"/>
+      </p:ext>
+    </p:extLst>
+  </p:cSld>
+  <p:clrMapOvr>
+    <a:masterClrMapping/>
+  </p:clrMapOvr>
+</p:notes>
+</file>
+
+<file path=ppt/notesSlides/notesSlide11.xml><?xml version="1.0" encoding="utf-8"?>
+<p:notes xmlns:a="http://schemas.openxmlformats.org/drawingml/2006/main" xmlns:r="http://schemas.openxmlformats.org/officeDocument/2006/relationships" xmlns:p="http://schemas.openxmlformats.org/presentationml/2006/main">
+  <p:cSld>
+    <p:spTree>
+      <p:nvGrpSpPr>
+        <p:cNvPr id="1" name=""/>
+        <p:cNvGrpSpPr/>
+        <p:nvPr/>
+      </p:nvGrpSpPr>
+      <p:grpSpPr>
+        <a:xfrm>
+          <a:off x="0" y="0"/>
+          <a:ext cx="0" cy="0"/>
+          <a:chOff x="0" y="0"/>
+          <a:chExt cx="0" cy="0"/>
+        </a:xfrm>
+      </p:grpSpPr>
+      <p:sp>
+        <p:nvSpPr>
+          <p:cNvPr id="2" name="Slide Image Placeholder 1"/>
+          <p:cNvSpPr>
+            <a:spLocks noGrp="1" noRot="1" noChangeAspect="1"/>
+          </p:cNvSpPr>
+          <p:nvPr>
+            <p:ph type="sldImg"/>
+          </p:nvPr>
+        </p:nvSpPr>
+        <p:spPr/>
+      </p:sp>
+      <p:sp>
+        <p:nvSpPr>
+          <p:cNvPr id="3" name="Notes Placeholder 2"/>
+          <p:cNvSpPr>
+            <a:spLocks noGrp="1"/>
+          </p:cNvSpPr>
+          <p:nvPr>
+            <p:ph type="body" idx="1"/>
+          </p:nvPr>
+        </p:nvSpPr>
+        <p:spPr/>
+        <p:txBody>
+          <a:bodyPr/>
+          <a:lstStyle/>
+          <a:p>
+            <a:endParaRPr lang="en-US" dirty="0"/>
+          </a:p>
+        </p:txBody>
+      </p:sp>
+      <p:sp>
+        <p:nvSpPr>
+          <p:cNvPr id="4" name="Slide Number Placeholder 3"/>
+          <p:cNvSpPr>
+            <a:spLocks noGrp="1"/>
+          </p:cNvSpPr>
+          <p:nvPr>
+            <p:ph type="sldNum" sz="quarter" idx="5"/>
+          </p:nvPr>
+        </p:nvSpPr>
+        <p:spPr/>
+        <p:txBody>
+          <a:bodyPr/>
+          <a:lstStyle/>
+          <a:p>
+            <a:fld id="{A7BE0B71-EBC6-E142-82B5-05C4AB56282B}" type="slidenum">
+              <a:rPr lang="en-US" smtClean="0"/>
+              <a:t>30</a:t>
+            </a:fld>
+            <a:endParaRPr lang="en-US"/>
+          </a:p>
+        </p:txBody>
+      </p:sp>
+    </p:spTree>
+    <p:extLst>
+      <p:ext uri="{BB962C8B-B14F-4D97-AF65-F5344CB8AC3E}">
+        <p14:creationId xmlns:p14="http://schemas.microsoft.com/office/powerpoint/2010/main" val="2547472888"/>
       </p:ext>
     </p:extLst>
   </p:cSld>
@@ -29183,6 +29268,262 @@
 </p:sld>
 </file>
 
+<file path=ppt/slides/slide30.xml><?xml version="1.0" encoding="utf-8"?>
+<p:sld xmlns:a="http://schemas.openxmlformats.org/drawingml/2006/main" xmlns:r="http://schemas.openxmlformats.org/officeDocument/2006/relationships" xmlns:p="http://schemas.openxmlformats.org/presentationml/2006/main">
+  <p:cSld>
+    <p:spTree>
+      <p:nvGrpSpPr>
+        <p:cNvPr id="1" name=""/>
+        <p:cNvGrpSpPr/>
+        <p:nvPr/>
+      </p:nvGrpSpPr>
+      <p:grpSpPr>
+        <a:xfrm>
+          <a:off x="0" y="0"/>
+          <a:ext cx="0" cy="0"/>
+          <a:chOff x="0" y="0"/>
+          <a:chExt cx="0" cy="0"/>
+        </a:xfrm>
+      </p:grpSpPr>
+      <p:sp>
+        <p:nvSpPr>
+          <p:cNvPr id="2" name="Title 1">
+            <a:extLst>
+              <a:ext uri="{FF2B5EF4-FFF2-40B4-BE49-F238E27FC236}">
+                <a16:creationId xmlns:a16="http://schemas.microsoft.com/office/drawing/2014/main" id="{14B0A902-AC8E-97F7-82AB-B99323CF667D}"/>
+              </a:ext>
+            </a:extLst>
+          </p:cNvPr>
+          <p:cNvSpPr>
+            <a:spLocks noGrp="1"/>
+          </p:cNvSpPr>
+          <p:nvPr>
+            <p:ph type="title"/>
+          </p:nvPr>
+        </p:nvSpPr>
+        <p:spPr/>
+        <p:txBody>
+          <a:bodyPr/>
+          <a:lstStyle/>
+          <a:p>
+            <a:r>
+              <a:rPr lang="en-US" dirty="0"/>
+              <a:t>What Else? Other File Import Packages</a:t>
+            </a:r>
+          </a:p>
+        </p:txBody>
+      </p:sp>
+      <p:pic>
+        <p:nvPicPr>
+          <p:cNvPr id="5" name="Picture 4" descr="A picture containing text, sign, computer&#10;&#10;Description automatically generated">
+            <a:extLst>
+              <a:ext uri="{FF2B5EF4-FFF2-40B4-BE49-F238E27FC236}">
+                <a16:creationId xmlns:a16="http://schemas.microsoft.com/office/drawing/2014/main" id="{63BD1783-DD9C-82A1-F836-F9929DEFDE84}"/>
+              </a:ext>
+            </a:extLst>
+          </p:cNvPr>
+          <p:cNvPicPr>
+            <a:picLocks noChangeAspect="1"/>
+          </p:cNvPicPr>
+          <p:nvPr/>
+        </p:nvPicPr>
+        <p:blipFill>
+          <a:blip r:embed="rId3"/>
+          <a:stretch>
+            <a:fillRect/>
+          </a:stretch>
+        </p:blipFill>
+        <p:spPr>
+          <a:xfrm>
+            <a:off x="832386" y="2241708"/>
+            <a:ext cx="2116876" cy="2374583"/>
+          </a:xfrm>
+          <a:prstGeom prst="rect">
+            <a:avLst/>
+          </a:prstGeom>
+        </p:spPr>
+      </p:pic>
+      <p:sp>
+        <p:nvSpPr>
+          <p:cNvPr id="6" name="TextBox 5">
+            <a:extLst>
+              <a:ext uri="{FF2B5EF4-FFF2-40B4-BE49-F238E27FC236}">
+                <a16:creationId xmlns:a16="http://schemas.microsoft.com/office/drawing/2014/main" id="{6FC01F38-7C61-FD24-BC7E-9407DED7AD19}"/>
+              </a:ext>
+            </a:extLst>
+          </p:cNvPr>
+          <p:cNvSpPr txBox="1"/>
+          <p:nvPr/>
+        </p:nvSpPr>
+        <p:spPr>
+          <a:xfrm>
+            <a:off x="154546" y="4893972"/>
+            <a:ext cx="3812147" cy="1200329"/>
+          </a:xfrm>
+          <a:prstGeom prst="rect">
+            <a:avLst/>
+          </a:prstGeom>
+          <a:noFill/>
+        </p:spPr>
+        <p:txBody>
+          <a:bodyPr wrap="square" rtlCol="0">
+            <a:spAutoFit/>
+          </a:bodyPr>
+          <a:lstStyle/>
+          <a:p>
+            <a:pPr algn="ctr"/>
+            <a:r>
+              <a:rPr lang="en-US" sz="3600" dirty="0"/>
+              <a:t>vroom: reading files fast</a:t>
+            </a:r>
+          </a:p>
+        </p:txBody>
+      </p:sp>
+      <p:pic>
+        <p:nvPicPr>
+          <p:cNvPr id="8" name="Picture 7" descr="A picture containing text, sign&#10;&#10;Description automatically generated">
+            <a:extLst>
+              <a:ext uri="{FF2B5EF4-FFF2-40B4-BE49-F238E27FC236}">
+                <a16:creationId xmlns:a16="http://schemas.microsoft.com/office/drawing/2014/main" id="{D942CCA0-91F1-45CD-41E6-7345844D350D}"/>
+              </a:ext>
+            </a:extLst>
+          </p:cNvPr>
+          <p:cNvPicPr>
+            <a:picLocks noChangeAspect="1"/>
+          </p:cNvPicPr>
+          <p:nvPr/>
+        </p:nvPicPr>
+        <p:blipFill>
+          <a:blip r:embed="rId4"/>
+          <a:stretch>
+            <a:fillRect/>
+          </a:stretch>
+        </p:blipFill>
+        <p:spPr>
+          <a:xfrm>
+            <a:off x="5150834" y="2442409"/>
+            <a:ext cx="1890332" cy="2173882"/>
+          </a:xfrm>
+          <a:prstGeom prst="rect">
+            <a:avLst/>
+          </a:prstGeom>
+        </p:spPr>
+      </p:pic>
+      <p:sp>
+        <p:nvSpPr>
+          <p:cNvPr id="9" name="TextBox 8">
+            <a:extLst>
+              <a:ext uri="{FF2B5EF4-FFF2-40B4-BE49-F238E27FC236}">
+                <a16:creationId xmlns:a16="http://schemas.microsoft.com/office/drawing/2014/main" id="{FDC8681E-AA4A-6471-DB13-6B1575A8270D}"/>
+              </a:ext>
+            </a:extLst>
+          </p:cNvPr>
+          <p:cNvSpPr txBox="1"/>
+          <p:nvPr/>
+        </p:nvSpPr>
+        <p:spPr>
+          <a:xfrm>
+            <a:off x="4189926" y="4893971"/>
+            <a:ext cx="3812147" cy="1200329"/>
+          </a:xfrm>
+          <a:prstGeom prst="rect">
+            <a:avLst/>
+          </a:prstGeom>
+          <a:noFill/>
+        </p:spPr>
+        <p:txBody>
+          <a:bodyPr wrap="square" rtlCol="0">
+            <a:spAutoFit/>
+          </a:bodyPr>
+          <a:lstStyle/>
+          <a:p>
+            <a:pPr algn="ctr"/>
+            <a:r>
+              <a:rPr lang="en-US" sz="3600" dirty="0"/>
+              <a:t>haven: reading SAS, SPSS, Stata</a:t>
+            </a:r>
+          </a:p>
+        </p:txBody>
+      </p:sp>
+      <p:pic>
+        <p:nvPicPr>
+          <p:cNvPr id="11" name="Picture 10" descr="A picture containing text, outdoor, sign, blue&#10;&#10;Description automatically generated">
+            <a:extLst>
+              <a:ext uri="{FF2B5EF4-FFF2-40B4-BE49-F238E27FC236}">
+                <a16:creationId xmlns:a16="http://schemas.microsoft.com/office/drawing/2014/main" id="{7886C39A-FFD2-259D-9820-868D454AEB65}"/>
+              </a:ext>
+            </a:extLst>
+          </p:cNvPr>
+          <p:cNvPicPr>
+            <a:picLocks noChangeAspect="1"/>
+          </p:cNvPicPr>
+          <p:nvPr/>
+        </p:nvPicPr>
+        <p:blipFill>
+          <a:blip r:embed="rId5"/>
+          <a:stretch>
+            <a:fillRect/>
+          </a:stretch>
+        </p:blipFill>
+        <p:spPr>
+          <a:xfrm>
+            <a:off x="9030237" y="2442409"/>
+            <a:ext cx="1890331" cy="2173881"/>
+          </a:xfrm>
+          <a:prstGeom prst="rect">
+            <a:avLst/>
+          </a:prstGeom>
+        </p:spPr>
+      </p:pic>
+      <p:sp>
+        <p:nvSpPr>
+          <p:cNvPr id="12" name="TextBox 11">
+            <a:extLst>
+              <a:ext uri="{FF2B5EF4-FFF2-40B4-BE49-F238E27FC236}">
+                <a16:creationId xmlns:a16="http://schemas.microsoft.com/office/drawing/2014/main" id="{609E4C94-6363-F262-C1B5-2FDBAE6D16B0}"/>
+              </a:ext>
+            </a:extLst>
+          </p:cNvPr>
+          <p:cNvSpPr txBox="1"/>
+          <p:nvPr/>
+        </p:nvSpPr>
+        <p:spPr>
+          <a:xfrm>
+            <a:off x="8069328" y="4893970"/>
+            <a:ext cx="3812147" cy="1754326"/>
+          </a:xfrm>
+          <a:prstGeom prst="rect">
+            <a:avLst/>
+          </a:prstGeom>
+          <a:noFill/>
+        </p:spPr>
+        <p:txBody>
+          <a:bodyPr wrap="square" rtlCol="0">
+            <a:spAutoFit/>
+          </a:bodyPr>
+          <a:lstStyle/>
+          <a:p>
+            <a:pPr algn="ctr"/>
+            <a:r>
+              <a:rPr lang="en-US" sz="3600" dirty="0"/>
+              <a:t>googlesheets4: interface to Google Sheets</a:t>
+            </a:r>
+          </a:p>
+        </p:txBody>
+      </p:sp>
+    </p:spTree>
+    <p:extLst>
+      <p:ext uri="{BB962C8B-B14F-4D97-AF65-F5344CB8AC3E}">
+        <p14:creationId xmlns:p14="http://schemas.microsoft.com/office/powerpoint/2010/main" val="3081185337"/>
+      </p:ext>
+    </p:extLst>
+  </p:cSld>
+  <p:clrMapOvr>
+    <a:masterClrMapping/>
+  </p:clrMapOvr>
+</p:sld>
+</file>
+
 <file path=ppt/slides/slide4.xml><?xml version="1.0" encoding="utf-8"?>
 <p:sld xmlns:a="http://schemas.openxmlformats.org/drawingml/2006/main" xmlns:r="http://schemas.openxmlformats.org/officeDocument/2006/relationships" xmlns:p="http://schemas.openxmlformats.org/presentationml/2006/main">
   <p:cSld>

</xml_diff>

<commit_message>
modifications based on live course
small edits recognized during live session
</commit_message>
<xml_diff>
--- a/slides/04 - Reading Files.pptx
+++ b/slides/04 - Reading Files.pptx
@@ -527,7 +527,7 @@
           <a:p>
             <a:fld id="{53D20FC1-34BC-144C-82AC-6F1B201A03F7}" type="datetimeFigureOut">
               <a:rPr lang="en-US" smtClean="0"/>
-              <a:t>3/28/23</a:t>
+              <a:t>4/8/23</a:t>
             </a:fld>
             <a:endParaRPr lang="en-US"/>
           </a:p>
@@ -10792,7 +10792,7 @@
           <a:p>
             <a:fld id="{47A382C8-082F-7542-B6CA-81A405A6B1A6}" type="datetimeFigureOut">
               <a:rPr lang="en-US" smtClean="0"/>
-              <a:t>3/28/23</a:t>
+              <a:t>4/8/23</a:t>
             </a:fld>
             <a:endParaRPr lang="en-US"/>
           </a:p>
@@ -10999,7 +10999,7 @@
           <a:p>
             <a:fld id="{47A382C8-082F-7542-B6CA-81A405A6B1A6}" type="datetimeFigureOut">
               <a:rPr lang="en-US" smtClean="0"/>
-              <a:t>3/28/23</a:t>
+              <a:t>4/8/23</a:t>
             </a:fld>
             <a:endParaRPr lang="en-US"/>
           </a:p>
@@ -11179,7 +11179,7 @@
           <a:p>
             <a:fld id="{47A382C8-082F-7542-B6CA-81A405A6B1A6}" type="datetimeFigureOut">
               <a:rPr lang="en-US" smtClean="0"/>
-              <a:t>3/28/23</a:t>
+              <a:t>4/8/23</a:t>
             </a:fld>
             <a:endParaRPr lang="en-US"/>
           </a:p>
@@ -11399,7 +11399,7 @@
           <a:p>
             <a:fld id="{47A382C8-082F-7542-B6CA-81A405A6B1A6}" type="datetimeFigureOut">
               <a:rPr lang="en-US" smtClean="0"/>
-              <a:t>3/28/23</a:t>
+              <a:t>4/8/23</a:t>
             </a:fld>
             <a:endParaRPr lang="en-US"/>
           </a:p>
@@ -20297,7 +20297,7 @@
           <a:p>
             <a:fld id="{47A382C8-082F-7542-B6CA-81A405A6B1A6}" type="datetimeFigureOut">
               <a:rPr lang="en-US" smtClean="0"/>
-              <a:t>3/28/23</a:t>
+              <a:t>4/8/23</a:t>
             </a:fld>
             <a:endParaRPr lang="en-US"/>
           </a:p>
@@ -20571,7 +20571,7 @@
           <a:p>
             <a:fld id="{47A382C8-082F-7542-B6CA-81A405A6B1A6}" type="datetimeFigureOut">
               <a:rPr lang="en-US" smtClean="0"/>
-              <a:t>3/28/23</a:t>
+              <a:t>4/8/23</a:t>
             </a:fld>
             <a:endParaRPr lang="en-US"/>
           </a:p>
@@ -20969,7 +20969,7 @@
           <a:p>
             <a:fld id="{47A382C8-082F-7542-B6CA-81A405A6B1A6}" type="datetimeFigureOut">
               <a:rPr lang="en-US" smtClean="0"/>
-              <a:t>3/28/23</a:t>
+              <a:t>4/8/23</a:t>
             </a:fld>
             <a:endParaRPr lang="en-US"/>
           </a:p>
@@ -21087,7 +21087,7 @@
           <a:p>
             <a:fld id="{47A382C8-082F-7542-B6CA-81A405A6B1A6}" type="datetimeFigureOut">
               <a:rPr lang="en-US" smtClean="0"/>
-              <a:t>3/28/23</a:t>
+              <a:t>4/8/23</a:t>
             </a:fld>
             <a:endParaRPr lang="en-US"/>
           </a:p>
@@ -21182,7 +21182,7 @@
           <a:p>
             <a:fld id="{47A382C8-082F-7542-B6CA-81A405A6B1A6}" type="datetimeFigureOut">
               <a:rPr lang="en-US" smtClean="0"/>
-              <a:t>3/28/23</a:t>
+              <a:t>4/8/23</a:t>
             </a:fld>
             <a:endParaRPr lang="en-US"/>
           </a:p>
@@ -21472,7 +21472,7 @@
           <a:p>
             <a:fld id="{47A382C8-082F-7542-B6CA-81A405A6B1A6}" type="datetimeFigureOut">
               <a:rPr lang="en-US" smtClean="0"/>
-              <a:t>3/28/23</a:t>
+              <a:t>4/8/23</a:t>
             </a:fld>
             <a:endParaRPr lang="en-US"/>
           </a:p>
@@ -21752,7 +21752,7 @@
           <a:p>
             <a:fld id="{47A382C8-082F-7542-B6CA-81A405A6B1A6}" type="datetimeFigureOut">
               <a:rPr lang="en-US" smtClean="0"/>
-              <a:t>3/28/23</a:t>
+              <a:t>4/8/23</a:t>
             </a:fld>
             <a:endParaRPr lang="en-US"/>
           </a:p>
@@ -22002,7 +22002,7 @@
           <a:p>
             <a:fld id="{47A382C8-082F-7542-B6CA-81A405A6B1A6}" type="datetimeFigureOut">
               <a:rPr lang="en-US" smtClean="0"/>
-              <a:t>3/28/23</a:t>
+              <a:t>4/8/23</a:t>
             </a:fld>
             <a:endParaRPr lang="en-US"/>
           </a:p>
@@ -22754,7 +22754,7 @@
                 <a:ea typeface="Monaco" charset="0"/>
                 <a:cs typeface="Monaco" charset="0"/>
               </a:rPr>
-              <a:t>(file = "path/</a:t>
+              <a:t>(path = "path/</a:t>
             </a:r>
             <a:r>
               <a:rPr lang="en-US" sz="2400" dirty="0" err="1">
@@ -23179,7 +23179,7 @@
                 <a:ea typeface="Monaco" charset="0"/>
                 <a:cs typeface="Monaco" charset="0"/>
               </a:rPr>
-              <a:t>(file = "path/</a:t>
+              <a:t>(path = "path/</a:t>
             </a:r>
             <a:r>
               <a:rPr lang="en-US" sz="2400" dirty="0" err="1">
@@ -23430,6 +23430,41 @@
                 </a:solidFill>
               </a:rPr>
               <a:t>helper function to define columns</a:t>
+            </a:r>
+          </a:p>
+        </p:txBody>
+      </p:sp>
+      <p:sp>
+        <p:nvSpPr>
+          <p:cNvPr id="7" name="TextBox 6">
+            <a:extLst>
+              <a:ext uri="{FF2B5EF4-FFF2-40B4-BE49-F238E27FC236}">
+                <a16:creationId xmlns:a16="http://schemas.microsoft.com/office/drawing/2014/main" id="{55786D72-042C-C522-120B-C6E60D500FC5}"/>
+              </a:ext>
+            </a:extLst>
+          </p:cNvPr>
+          <p:cNvSpPr txBox="1"/>
+          <p:nvPr/>
+        </p:nvSpPr>
+        <p:spPr>
+          <a:xfrm>
+            <a:off x="766519" y="5734112"/>
+            <a:ext cx="5503173" cy="400110"/>
+          </a:xfrm>
+          <a:prstGeom prst="rect">
+            <a:avLst/>
+          </a:prstGeom>
+          <a:noFill/>
+        </p:spPr>
+        <p:txBody>
+          <a:bodyPr wrap="none" rtlCol="0">
+            <a:spAutoFit/>
+          </a:bodyPr>
+          <a:lstStyle/>
+          <a:p>
+            <a:r>
+              <a:rPr lang="en-US" sz="2000" dirty="0"/>
+              <a:t>In multi-sheet file, reads in first worksheet by default</a:t>
             </a:r>
           </a:p>
         </p:txBody>
@@ -23620,7 +23655,7 @@
                 <a:ea typeface="Monaco" charset="0"/>
                 <a:cs typeface="Monaco" charset="0"/>
               </a:rPr>
-              <a:t>(file = "path/</a:t>
+              <a:t>(path = "path/</a:t>
             </a:r>
             <a:r>
               <a:rPr lang="en-US" sz="2400" dirty="0" err="1">
@@ -31099,7 +31134,7 @@
                 <a:ea typeface="Monaco" charset="0"/>
                 <a:cs typeface="Monaco" charset="0"/>
               </a:rPr>
-              <a:t>(file = "path/</a:t>
+              <a:t>(path = "path/</a:t>
             </a:r>
             <a:r>
               <a:rPr lang="en-US" sz="2400" dirty="0" err="1">

</xml_diff>